<commit_message>
Remove reference to company name
</commit_message>
<xml_diff>
--- a/Summary GPS Signal.pptx
+++ b/Summary GPS Signal.pptx
@@ -236,7 +236,7 @@
           <a:p>
             <a:fld id="{21D3BC9C-6C58-464F-B94E-FD73C5FB016E}" type="datetimeFigureOut">
               <a:rPr lang="en-US" smtClean="0"/>
-              <a:t>4/29/2019</a:t>
+              <a:t>5/6/2019</a:t>
             </a:fld>
             <a:endParaRPr lang="en-US" dirty="0"/>
           </a:p>
@@ -650,7 +650,7 @@
           <a:p>
             <a:fld id="{40DA1498-92C7-4E4B-8045-C9195F453964}" type="datetimeFigureOut">
               <a:rPr lang="en-US" smtClean="0"/>
-              <a:t>4/29/2019</a:t>
+              <a:t>5/6/2019</a:t>
             </a:fld>
             <a:endParaRPr lang="en-US" dirty="0"/>
           </a:p>
@@ -848,7 +848,7 @@
           <a:p>
             <a:fld id="{40DA1498-92C7-4E4B-8045-C9195F453964}" type="datetimeFigureOut">
               <a:rPr lang="en-US" smtClean="0"/>
-              <a:t>4/29/2019</a:t>
+              <a:t>5/6/2019</a:t>
             </a:fld>
             <a:endParaRPr lang="en-US" dirty="0"/>
           </a:p>
@@ -1056,7 +1056,7 @@
           <a:p>
             <a:fld id="{40DA1498-92C7-4E4B-8045-C9195F453964}" type="datetimeFigureOut">
               <a:rPr lang="en-US" smtClean="0"/>
-              <a:t>4/29/2019</a:t>
+              <a:t>5/6/2019</a:t>
             </a:fld>
             <a:endParaRPr lang="en-US" dirty="0"/>
           </a:p>
@@ -1254,7 +1254,7 @@
           <a:p>
             <a:fld id="{40DA1498-92C7-4E4B-8045-C9195F453964}" type="datetimeFigureOut">
               <a:rPr lang="en-US" smtClean="0"/>
-              <a:t>4/29/2019</a:t>
+              <a:t>5/6/2019</a:t>
             </a:fld>
             <a:endParaRPr lang="en-US" dirty="0"/>
           </a:p>
@@ -1529,7 +1529,7 @@
           <a:p>
             <a:fld id="{40DA1498-92C7-4E4B-8045-C9195F453964}" type="datetimeFigureOut">
               <a:rPr lang="en-US" smtClean="0"/>
-              <a:t>4/29/2019</a:t>
+              <a:t>5/6/2019</a:t>
             </a:fld>
             <a:endParaRPr lang="en-US" dirty="0"/>
           </a:p>
@@ -1794,7 +1794,7 @@
           <a:p>
             <a:fld id="{40DA1498-92C7-4E4B-8045-C9195F453964}" type="datetimeFigureOut">
               <a:rPr lang="en-US" smtClean="0"/>
-              <a:t>4/29/2019</a:t>
+              <a:t>5/6/2019</a:t>
             </a:fld>
             <a:endParaRPr lang="en-US" dirty="0"/>
           </a:p>
@@ -2206,7 +2206,7 @@
           <a:p>
             <a:fld id="{40DA1498-92C7-4E4B-8045-C9195F453964}" type="datetimeFigureOut">
               <a:rPr lang="en-US" smtClean="0"/>
-              <a:t>4/29/2019</a:t>
+              <a:t>5/6/2019</a:t>
             </a:fld>
             <a:endParaRPr lang="en-US" dirty="0"/>
           </a:p>
@@ -2347,7 +2347,7 @@
           <a:p>
             <a:fld id="{40DA1498-92C7-4E4B-8045-C9195F453964}" type="datetimeFigureOut">
               <a:rPr lang="en-US" smtClean="0"/>
-              <a:t>4/29/2019</a:t>
+              <a:t>5/6/2019</a:t>
             </a:fld>
             <a:endParaRPr lang="en-US" dirty="0"/>
           </a:p>
@@ -2460,7 +2460,7 @@
           <a:p>
             <a:fld id="{40DA1498-92C7-4E4B-8045-C9195F453964}" type="datetimeFigureOut">
               <a:rPr lang="en-US" smtClean="0"/>
-              <a:t>4/29/2019</a:t>
+              <a:t>5/6/2019</a:t>
             </a:fld>
             <a:endParaRPr lang="en-US" dirty="0"/>
           </a:p>
@@ -2771,7 +2771,7 @@
           <a:p>
             <a:fld id="{40DA1498-92C7-4E4B-8045-C9195F453964}" type="datetimeFigureOut">
               <a:rPr lang="en-US" smtClean="0"/>
-              <a:t>4/29/2019</a:t>
+              <a:t>5/6/2019</a:t>
             </a:fld>
             <a:endParaRPr lang="en-US" dirty="0"/>
           </a:p>
@@ -3063,7 +3063,7 @@
           <a:p>
             <a:fld id="{40DA1498-92C7-4E4B-8045-C9195F453964}" type="datetimeFigureOut">
               <a:rPr lang="en-US" smtClean="0"/>
-              <a:t>4/29/2019</a:t>
+              <a:t>5/6/2019</a:t>
             </a:fld>
             <a:endParaRPr lang="en-US" dirty="0"/>
           </a:p>
@@ -3304,7 +3304,7 @@
           <a:p>
             <a:fld id="{40DA1498-92C7-4E4B-8045-C9195F453964}" type="datetimeFigureOut">
               <a:rPr lang="en-US" smtClean="0"/>
-              <a:t>4/29/2019</a:t>
+              <a:t>5/6/2019</a:t>
             </a:fld>
             <a:endParaRPr lang="en-US" dirty="0"/>
           </a:p>
@@ -3775,12 +3775,20 @@
               <a:t>GPS Signal Analysis </a:t>
             </a:r>
             <a:r>
+              <a:rPr lang="en-US" sz="3600" dirty="0" err="1">
+                <a:solidFill>
+                  <a:schemeClr val="accent4"/>
+                </a:solidFill>
+              </a:rPr>
+              <a:t>PhnTmAuto</a:t>
+            </a:r>
+            <a:r>
               <a:rPr lang="en-US" sz="3600" dirty="0">
                 <a:solidFill>
                   <a:schemeClr val="accent4"/>
                 </a:solidFill>
               </a:rPr>
-              <a:t>Phantom Auto Assignment</a:t>
+              <a:t> Assignment</a:t>
             </a:r>
             <a:br>
               <a:rPr lang="en-US" sz="4000" dirty="0">

</xml_diff>